<commit_message>
edit add to cart
</commit_message>
<xml_diff>
--- a/static_midterm/midterm,video,report,powerpoint/midterm_g3.pptx
+++ b/static_midterm/midterm,video,report,powerpoint/midterm_g3.pptx
@@ -22,35 +22,36 @@
     <p:sldId id="267" r:id="rId17"/>
     <p:sldId id="268" r:id="rId18"/>
     <p:sldId id="269" r:id="rId19"/>
+    <p:sldId id="270" r:id="rId20"/>
   </p:sldIdLst>
   <p:sldSz cy="5143500" cx="9144000"/>
   <p:notesSz cx="6858000" cy="9144000"/>
   <p:embeddedFontLst>
     <p:embeddedFont>
       <p:font typeface="Playfair Display"/>
-      <p:regular r:id="rId20"/>
-      <p:bold r:id="rId21"/>
-      <p:italic r:id="rId22"/>
-      <p:boldItalic r:id="rId23"/>
+      <p:regular r:id="rId21"/>
+      <p:bold r:id="rId22"/>
+      <p:italic r:id="rId23"/>
+      <p:boldItalic r:id="rId24"/>
     </p:embeddedFont>
     <p:embeddedFont>
       <p:font typeface="Montserrat"/>
-      <p:regular r:id="rId24"/>
-      <p:bold r:id="rId25"/>
-      <p:italic r:id="rId26"/>
-      <p:boldItalic r:id="rId27"/>
+      <p:regular r:id="rId25"/>
+      <p:bold r:id="rId26"/>
+      <p:italic r:id="rId27"/>
+      <p:boldItalic r:id="rId28"/>
     </p:embeddedFont>
     <p:embeddedFont>
       <p:font typeface="Lora"/>
-      <p:regular r:id="rId28"/>
-      <p:bold r:id="rId29"/>
-      <p:italic r:id="rId30"/>
-      <p:boldItalic r:id="rId31"/>
+      <p:regular r:id="rId29"/>
+      <p:bold r:id="rId30"/>
+      <p:italic r:id="rId31"/>
+      <p:boldItalic r:id="rId32"/>
     </p:embeddedFont>
     <p:embeddedFont>
       <p:font typeface="Oswald"/>
-      <p:regular r:id="rId32"/>
-      <p:bold r:id="rId33"/>
+      <p:regular r:id="rId33"/>
+      <p:bold r:id="rId34"/>
     </p:embeddedFont>
   </p:embeddedFontLst>
   <p:defaultTextStyle>
@@ -298,7 +299,7 @@
       </p15:sldGuideLst>
     </p:ext>
     <p:ext uri="http://customooxmlschemas.google.com/">
-      <go:slidesCustomData xmlns:go="http://customooxmlschemas.google.com/" r:id="rId34" roundtripDataSignature="AMtx7miyFmh6qVNWWgNltI6jVfNgnoSK+g=="/>
+      <go:slidesCustomData xmlns:go="http://customooxmlschemas.google.com/" r:id="rId35" roundtripDataSignature="AMtx7mgd/ZvxhN0P8WkC07qmhPsgipHUJg=="/>
     </p:ext>
   </p:extLst>
 </p:presentation>
@@ -1001,7 +1002,7 @@
       </p:grpSpPr>
       <p:sp>
         <p:nvSpPr>
-          <p:cNvPr id="111" name="Google Shape;111;gb2cae244c0_0_11:notes"/>
+          <p:cNvPr id="111" name="Google Shape;111;gba2ec81220_0_0:notes"/>
           <p:cNvSpPr/>
           <p:nvPr>
             <p:ph idx="2" type="sldImg"/>
@@ -1036,7 +1037,7 @@
       </p:sp>
       <p:sp>
         <p:nvSpPr>
-          <p:cNvPr id="112" name="Google Shape;112;gb2cae244c0_0_11:notes"/>
+          <p:cNvPr id="112" name="Google Shape;112;gba2ec81220_0_0:notes"/>
           <p:cNvSpPr txBox="1"/>
           <p:nvPr>
             <p:ph idx="1" type="body"/>
@@ -1100,7 +1101,106 @@
       </p:grpSpPr>
       <p:sp>
         <p:nvSpPr>
-          <p:cNvPr id="118" name="Google Shape;118;p20:notes"/>
+          <p:cNvPr id="118" name="Google Shape;118;gba2ec81220_0_12:notes"/>
+          <p:cNvSpPr/>
+          <p:nvPr>
+            <p:ph idx="2" type="sldImg"/>
+          </p:nvPr>
+        </p:nvSpPr>
+        <p:spPr>
+          <a:xfrm>
+            <a:off x="381300" y="685800"/>
+            <a:ext cx="6096000" cy="3429000"/>
+          </a:xfrm>
+          <a:custGeom>
+            <a:rect b="b" l="l" r="r" t="t"/>
+            <a:pathLst>
+              <a:path extrusionOk="0" h="120000" w="120000">
+                <a:moveTo>
+                  <a:pt x="0" y="0"/>
+                </a:moveTo>
+                <a:lnTo>
+                  <a:pt x="120000" y="0"/>
+                </a:lnTo>
+                <a:lnTo>
+                  <a:pt x="120000" y="120000"/>
+                </a:lnTo>
+                <a:lnTo>
+                  <a:pt x="0" y="120000"/>
+                </a:lnTo>
+                <a:close/>
+              </a:path>
+            </a:pathLst>
+          </a:custGeom>
+        </p:spPr>
+      </p:sp>
+      <p:sp>
+        <p:nvSpPr>
+          <p:cNvPr id="119" name="Google Shape;119;gba2ec81220_0_12:notes"/>
+          <p:cNvSpPr txBox="1"/>
+          <p:nvPr>
+            <p:ph idx="1" type="body"/>
+          </p:nvPr>
+        </p:nvSpPr>
+        <p:spPr>
+          <a:xfrm>
+            <a:off x="685800" y="4343400"/>
+            <a:ext cx="5486400" cy="4114800"/>
+          </a:xfrm>
+          <a:prstGeom prst="rect">
+            <a:avLst/>
+          </a:prstGeom>
+        </p:spPr>
+        <p:txBody>
+          <a:bodyPr anchorCtr="0" anchor="t" bIns="91425" lIns="91425" spcFirstLastPara="1" rIns="91425" wrap="square" tIns="91425">
+            <a:noAutofit/>
+          </a:bodyPr>
+          <a:lstStyle/>
+          <a:p>
+            <a:pPr indent="0" lvl="0" marL="0" rtl="0" algn="l">
+              <a:spcBef>
+                <a:spcPts val="0"/>
+              </a:spcBef>
+              <a:spcAft>
+                <a:spcPts val="0"/>
+              </a:spcAft>
+              <a:buNone/>
+            </a:pPr>
+            <a:r>
+              <a:t/>
+            </a:r>
+            <a:endParaRPr/>
+          </a:p>
+        </p:txBody>
+      </p:sp>
+    </p:spTree>
+  </p:cSld>
+  <p:clrMapOvr>
+    <a:masterClrMapping/>
+  </p:clrMapOvr>
+</p:notes>
+</file>
+
+<file path=ppt/notesSlides/notesSlide12.xml><?xml version="1.0" encoding="utf-8"?>
+<p:notes xmlns:a="http://schemas.openxmlformats.org/drawingml/2006/main" xmlns:r="http://schemas.openxmlformats.org/officeDocument/2006/relationships" xmlns:mc="http://schemas.openxmlformats.org/markup-compatibility/2006" xmlns:mv="urn:schemas-microsoft-com:mac:vml" xmlns:p="http://schemas.openxmlformats.org/presentationml/2006/main" xmlns:c="http://schemas.openxmlformats.org/drawingml/2006/chart" xmlns:dgm="http://schemas.openxmlformats.org/drawingml/2006/diagram" xmlns:o="urn:schemas-microsoft-com:office:office" xmlns:v="urn:schemas-microsoft-com:vml" xmlns:pvml="urn:schemas-microsoft-com:office:powerpoint" xmlns:com="http://schemas.openxmlformats.org/drawingml/2006/compatibility" xmlns:p14="http://schemas.microsoft.com/office/powerpoint/2010/main" xmlns:p15="http://schemas.microsoft.com/office/powerpoint/2012/main" xmlns:ahyp="http://schemas.microsoft.com/office/drawing/2018/hyperlinkcolor" showMasterPhAnim="0" showMasterSp="0">
+  <p:cSld>
+    <p:spTree>
+      <p:nvGrpSpPr>
+        <p:cNvPr id="124" name="Shape 124"/>
+        <p:cNvGrpSpPr/>
+        <p:nvPr/>
+      </p:nvGrpSpPr>
+      <p:grpSpPr>
+        <a:xfrm>
+          <a:off x="0" y="0"/>
+          <a:ext cx="0" cy="0"/>
+          <a:chOff x="0" y="0"/>
+          <a:chExt cx="0" cy="0"/>
+        </a:xfrm>
+      </p:grpSpPr>
+      <p:sp>
+        <p:nvSpPr>
+          <p:cNvPr id="125" name="Google Shape;125;p20:notes"/>
           <p:cNvSpPr/>
           <p:nvPr>
             <p:ph idx="2" type="sldImg"/>
@@ -1145,7 +1245,7 @@
       </p:sp>
       <p:sp>
         <p:nvSpPr>
-          <p:cNvPr id="119" name="Google Shape;119;p20:notes"/>
+          <p:cNvPr id="126" name="Google Shape;126;p20:notes"/>
           <p:cNvSpPr txBox="1"/>
           <p:nvPr>
             <p:ph idx="1" type="body"/>
@@ -1198,12 +1298,12 @@
 </p:notes>
 </file>
 
-<file path=ppt/notesSlides/notesSlide12.xml><?xml version="1.0" encoding="utf-8"?>
+<file path=ppt/notesSlides/notesSlide13.xml><?xml version="1.0" encoding="utf-8"?>
 <p:notes xmlns:a="http://schemas.openxmlformats.org/drawingml/2006/main" xmlns:r="http://schemas.openxmlformats.org/officeDocument/2006/relationships" xmlns:mc="http://schemas.openxmlformats.org/markup-compatibility/2006" xmlns:mv="urn:schemas-microsoft-com:mac:vml" xmlns:p="http://schemas.openxmlformats.org/presentationml/2006/main" xmlns:c="http://schemas.openxmlformats.org/drawingml/2006/chart" xmlns:dgm="http://schemas.openxmlformats.org/drawingml/2006/diagram" xmlns:o="urn:schemas-microsoft-com:office:office" xmlns:v="urn:schemas-microsoft-com:vml" xmlns:pvml="urn:schemas-microsoft-com:office:powerpoint" xmlns:com="http://schemas.openxmlformats.org/drawingml/2006/compatibility" xmlns:p14="http://schemas.microsoft.com/office/powerpoint/2010/main" xmlns:p15="http://schemas.microsoft.com/office/powerpoint/2012/main" xmlns:ahyp="http://schemas.microsoft.com/office/drawing/2018/hyperlinkcolor" showMasterPhAnim="0" showMasterSp="0">
   <p:cSld>
     <p:spTree>
       <p:nvGrpSpPr>
-        <p:cNvPr id="125" name="Shape 125"/>
+        <p:cNvPr id="132" name="Shape 132"/>
         <p:cNvGrpSpPr/>
         <p:nvPr/>
       </p:nvGrpSpPr>
@@ -1217,7 +1317,7 @@
       </p:grpSpPr>
       <p:sp>
         <p:nvSpPr>
-          <p:cNvPr id="126" name="Google Shape;126;p21:notes"/>
+          <p:cNvPr id="133" name="Google Shape;133;p21:notes"/>
           <p:cNvSpPr/>
           <p:nvPr>
             <p:ph idx="2" type="sldImg"/>
@@ -1262,7 +1362,7 @@
       </p:sp>
       <p:sp>
         <p:nvSpPr>
-          <p:cNvPr id="127" name="Google Shape;127;p21:notes"/>
+          <p:cNvPr id="134" name="Google Shape;134;p21:notes"/>
           <p:cNvSpPr txBox="1"/>
           <p:nvPr>
             <p:ph idx="1" type="body"/>
@@ -1315,12 +1415,12 @@
 </p:notes>
 </file>
 
-<file path=ppt/notesSlides/notesSlide13.xml><?xml version="1.0" encoding="utf-8"?>
+<file path=ppt/notesSlides/notesSlide14.xml><?xml version="1.0" encoding="utf-8"?>
 <p:notes xmlns:a="http://schemas.openxmlformats.org/drawingml/2006/main" xmlns:r="http://schemas.openxmlformats.org/officeDocument/2006/relationships" xmlns:mc="http://schemas.openxmlformats.org/markup-compatibility/2006" xmlns:mv="urn:schemas-microsoft-com:mac:vml" xmlns:p="http://schemas.openxmlformats.org/presentationml/2006/main" xmlns:c="http://schemas.openxmlformats.org/drawingml/2006/chart" xmlns:dgm="http://schemas.openxmlformats.org/drawingml/2006/diagram" xmlns:o="urn:schemas-microsoft-com:office:office" xmlns:v="urn:schemas-microsoft-com:vml" xmlns:pvml="urn:schemas-microsoft-com:office:powerpoint" xmlns:com="http://schemas.openxmlformats.org/drawingml/2006/compatibility" xmlns:p14="http://schemas.microsoft.com/office/powerpoint/2010/main" xmlns:p15="http://schemas.microsoft.com/office/powerpoint/2012/main" xmlns:ahyp="http://schemas.microsoft.com/office/drawing/2018/hyperlinkcolor" showMasterPhAnim="0" showMasterSp="0">
   <p:cSld>
     <p:spTree>
       <p:nvGrpSpPr>
-        <p:cNvPr id="134" name="Shape 134"/>
+        <p:cNvPr id="141" name="Shape 141"/>
         <p:cNvGrpSpPr/>
         <p:nvPr/>
       </p:nvGrpSpPr>
@@ -1334,7 +1434,7 @@
       </p:grpSpPr>
       <p:sp>
         <p:nvSpPr>
-          <p:cNvPr id="135" name="Google Shape;135;p23:notes"/>
+          <p:cNvPr id="142" name="Google Shape;142;p23:notes"/>
           <p:cNvSpPr/>
           <p:nvPr>
             <p:ph idx="2" type="sldImg"/>
@@ -1379,7 +1479,7 @@
       </p:sp>
       <p:sp>
         <p:nvSpPr>
-          <p:cNvPr id="136" name="Google Shape;136;p23:notes"/>
+          <p:cNvPr id="143" name="Google Shape;143;p23:notes"/>
           <p:cNvSpPr txBox="1"/>
           <p:nvPr>
             <p:ph idx="1" type="body"/>
@@ -1432,12 +1532,12 @@
 </p:notes>
 </file>
 
-<file path=ppt/notesSlides/notesSlide14.xml><?xml version="1.0" encoding="utf-8"?>
+<file path=ppt/notesSlides/notesSlide15.xml><?xml version="1.0" encoding="utf-8"?>
 <p:notes xmlns:a="http://schemas.openxmlformats.org/drawingml/2006/main" xmlns:r="http://schemas.openxmlformats.org/officeDocument/2006/relationships" xmlns:mc="http://schemas.openxmlformats.org/markup-compatibility/2006" xmlns:mv="urn:schemas-microsoft-com:mac:vml" xmlns:p="http://schemas.openxmlformats.org/presentationml/2006/main" xmlns:c="http://schemas.openxmlformats.org/drawingml/2006/chart" xmlns:dgm="http://schemas.openxmlformats.org/drawingml/2006/diagram" xmlns:o="urn:schemas-microsoft-com:office:office" xmlns:v="urn:schemas-microsoft-com:vml" xmlns:pvml="urn:schemas-microsoft-com:office:powerpoint" xmlns:com="http://schemas.openxmlformats.org/drawingml/2006/compatibility" xmlns:p14="http://schemas.microsoft.com/office/powerpoint/2010/main" xmlns:p15="http://schemas.microsoft.com/office/powerpoint/2012/main" xmlns:ahyp="http://schemas.microsoft.com/office/drawing/2018/hyperlinkcolor" showMasterPhAnim="0" showMasterSp="0">
   <p:cSld>
     <p:spTree>
       <p:nvGrpSpPr>
-        <p:cNvPr id="141" name="Shape 141"/>
+        <p:cNvPr id="148" name="Shape 148"/>
         <p:cNvGrpSpPr/>
         <p:nvPr/>
       </p:nvGrpSpPr>
@@ -1451,7 +1551,7 @@
       </p:grpSpPr>
       <p:sp>
         <p:nvSpPr>
-          <p:cNvPr id="142" name="Google Shape;142;gb2cae244c0_0_37:notes"/>
+          <p:cNvPr id="149" name="Google Shape;149;gb2cae244c0_0_37:notes"/>
           <p:cNvSpPr/>
           <p:nvPr>
             <p:ph idx="2" type="sldImg"/>
@@ -1482,11 +1582,21 @@
               </a:path>
             </a:pathLst>
           </a:custGeom>
+          <a:noFill/>
+          <a:ln cap="flat" cmpd="sng" w="9525">
+            <a:solidFill>
+              <a:srgbClr val="000000"/>
+            </a:solidFill>
+            <a:prstDash val="solid"/>
+            <a:round/>
+            <a:headEnd len="sm" w="sm" type="none"/>
+            <a:tailEnd len="sm" w="sm" type="none"/>
+          </a:ln>
         </p:spPr>
       </p:sp>
       <p:sp>
         <p:nvSpPr>
-          <p:cNvPr id="143" name="Google Shape;143;gb2cae244c0_0_37:notes"/>
+          <p:cNvPr id="150" name="Google Shape;150;gb2cae244c0_0_37:notes"/>
           <p:cNvSpPr txBox="1"/>
           <p:nvPr>
             <p:ph idx="1" type="body"/>
@@ -1500,6 +1610,10 @@
           <a:prstGeom prst="rect">
             <a:avLst/>
           </a:prstGeom>
+          <a:noFill/>
+          <a:ln>
+            <a:noFill/>
+          </a:ln>
         </p:spPr>
         <p:txBody>
           <a:bodyPr anchorCtr="0" anchor="t" bIns="91425" lIns="91425" spcFirstLastPara="1" rIns="91425" wrap="square" tIns="91425">
@@ -1508,12 +1622,16 @@
           <a:lstStyle/>
           <a:p>
             <a:pPr indent="0" lvl="0" marL="0" rtl="0" algn="l">
-              <a:spcBef>
-                <a:spcPts val="0"/>
-              </a:spcBef>
-              <a:spcAft>
-                <a:spcPts val="0"/>
-              </a:spcAft>
+              <a:lnSpc>
+                <a:spcPct val="100000"/>
+              </a:lnSpc>
+              <a:spcBef>
+                <a:spcPts val="0"/>
+              </a:spcBef>
+              <a:spcAft>
+                <a:spcPts val="0"/>
+              </a:spcAft>
+              <a:buSzPts val="1100"/>
               <a:buNone/>
             </a:pPr>
             <a:r>
@@ -5053,8 +5171,15 @@
 </file>
 
 <file path=ppt/slideLayouts/slideLayout3.xml><?xml version="1.0" encoding="utf-8"?>
-<p:sldLayout xmlns:a="http://schemas.openxmlformats.org/drawingml/2006/main" xmlns:r="http://schemas.openxmlformats.org/officeDocument/2006/relationships" xmlns:mc="http://schemas.openxmlformats.org/markup-compatibility/2006" xmlns:mv="urn:schemas-microsoft-com:mac:vml" xmlns:p="http://schemas.openxmlformats.org/presentationml/2006/main" xmlns:c="http://schemas.openxmlformats.org/drawingml/2006/chart" xmlns:dgm="http://schemas.openxmlformats.org/drawingml/2006/diagram" xmlns:o="urn:schemas-microsoft-com:office:office" xmlns:v="urn:schemas-microsoft-com:vml" xmlns:pvml="urn:schemas-microsoft-com:office:powerpoint" xmlns:com="http://schemas.openxmlformats.org/drawingml/2006/compatibility" xmlns:p14="http://schemas.microsoft.com/office/powerpoint/2010/main" xmlns:p15="http://schemas.microsoft.com/office/powerpoint/2012/main" xmlns:ahyp="http://schemas.microsoft.com/office/drawing/2018/hyperlinkcolor" matchingName="Blank" type="blank">
-  <p:cSld name="BLANK">
+<p:sldLayout xmlns:a="http://schemas.openxmlformats.org/drawingml/2006/main" xmlns:r="http://schemas.openxmlformats.org/officeDocument/2006/relationships" xmlns:mc="http://schemas.openxmlformats.org/markup-compatibility/2006" xmlns:mv="urn:schemas-microsoft-com:mac:vml" xmlns:p="http://schemas.openxmlformats.org/presentationml/2006/main" xmlns:c="http://schemas.openxmlformats.org/drawingml/2006/chart" xmlns:dgm="http://schemas.openxmlformats.org/drawingml/2006/diagram" xmlns:o="urn:schemas-microsoft-com:office:office" xmlns:v="urn:schemas-microsoft-com:vml" xmlns:pvml="urn:schemas-microsoft-com:office:powerpoint" xmlns:com="http://schemas.openxmlformats.org/drawingml/2006/compatibility" xmlns:p14="http://schemas.microsoft.com/office/powerpoint/2010/main" xmlns:p15="http://schemas.microsoft.com/office/powerpoint/2012/main" xmlns:ahyp="http://schemas.microsoft.com/office/drawing/2018/hyperlinkcolor" matchingName="Section header" type="secHead">
+  <p:cSld name="SECTION_HEADER">
+    <p:bg>
+      <p:bgPr>
+        <a:solidFill>
+          <a:schemeClr val="accent5"/>
+        </a:solidFill>
+      </p:bgPr>
+    </p:bg>
     <p:spTree>
       <p:nvGrpSpPr>
         <p:cNvPr id="19" name="Shape 19"/>
@@ -5071,318 +5196,7 @@
       </p:grpSpPr>
       <p:sp>
         <p:nvSpPr>
-          <p:cNvPr id="20" name="Google Shape;20;p27"/>
-          <p:cNvSpPr txBox="1"/>
-          <p:nvPr>
-            <p:ph idx="12" type="sldNum"/>
-          </p:nvPr>
-        </p:nvSpPr>
-        <p:spPr>
-          <a:xfrm>
-            <a:off x="8497999" y="4688759"/>
-            <a:ext cx="548700" cy="393600"/>
-          </a:xfrm>
-          <a:prstGeom prst="rect">
-            <a:avLst/>
-          </a:prstGeom>
-          <a:noFill/>
-          <a:ln>
-            <a:noFill/>
-          </a:ln>
-        </p:spPr>
-        <p:txBody>
-          <a:bodyPr anchorCtr="0" anchor="ctr" bIns="91425" lIns="91425" spcFirstLastPara="1" rIns="91425" wrap="square" tIns="91425">
-            <a:noAutofit/>
-          </a:bodyPr>
-          <a:lstStyle>
-            <a:lvl1pPr indent="0" lvl="0" marL="0" marR="0" algn="r">
-              <a:lnSpc>
-                <a:spcPct val="100000"/>
-              </a:lnSpc>
-              <a:spcBef>
-                <a:spcPts val="0"/>
-              </a:spcBef>
-              <a:spcAft>
-                <a:spcPts val="0"/>
-              </a:spcAft>
-              <a:buClr>
-                <a:srgbClr val="000000"/>
-              </a:buClr>
-              <a:buSzPts val="1000"/>
-              <a:buFont typeface="Arial"/>
-              <a:buNone/>
-              <a:defRPr b="0" i="0" sz="1000" u="none" cap="none" strike="noStrike">
-                <a:solidFill>
-                  <a:schemeClr val="dk2"/>
-                </a:solidFill>
-                <a:latin typeface="Playfair Display"/>
-                <a:ea typeface="Playfair Display"/>
-                <a:cs typeface="Playfair Display"/>
-                <a:sym typeface="Playfair Display"/>
-              </a:defRPr>
-            </a:lvl1pPr>
-            <a:lvl2pPr indent="0" lvl="1" marL="0" marR="0" algn="r">
-              <a:lnSpc>
-                <a:spcPct val="100000"/>
-              </a:lnSpc>
-              <a:spcBef>
-                <a:spcPts val="0"/>
-              </a:spcBef>
-              <a:spcAft>
-                <a:spcPts val="0"/>
-              </a:spcAft>
-              <a:buClr>
-                <a:srgbClr val="000000"/>
-              </a:buClr>
-              <a:buSzPts val="1000"/>
-              <a:buFont typeface="Arial"/>
-              <a:buNone/>
-              <a:defRPr b="0" i="0" sz="1000" u="none" cap="none" strike="noStrike">
-                <a:solidFill>
-                  <a:schemeClr val="dk2"/>
-                </a:solidFill>
-                <a:latin typeface="Playfair Display"/>
-                <a:ea typeface="Playfair Display"/>
-                <a:cs typeface="Playfair Display"/>
-                <a:sym typeface="Playfair Display"/>
-              </a:defRPr>
-            </a:lvl2pPr>
-            <a:lvl3pPr indent="0" lvl="2" marL="0" marR="0" algn="r">
-              <a:lnSpc>
-                <a:spcPct val="100000"/>
-              </a:lnSpc>
-              <a:spcBef>
-                <a:spcPts val="0"/>
-              </a:spcBef>
-              <a:spcAft>
-                <a:spcPts val="0"/>
-              </a:spcAft>
-              <a:buClr>
-                <a:srgbClr val="000000"/>
-              </a:buClr>
-              <a:buSzPts val="1000"/>
-              <a:buFont typeface="Arial"/>
-              <a:buNone/>
-              <a:defRPr b="0" i="0" sz="1000" u="none" cap="none" strike="noStrike">
-                <a:solidFill>
-                  <a:schemeClr val="dk2"/>
-                </a:solidFill>
-                <a:latin typeface="Playfair Display"/>
-                <a:ea typeface="Playfair Display"/>
-                <a:cs typeface="Playfair Display"/>
-                <a:sym typeface="Playfair Display"/>
-              </a:defRPr>
-            </a:lvl3pPr>
-            <a:lvl4pPr indent="0" lvl="3" marL="0" marR="0" algn="r">
-              <a:lnSpc>
-                <a:spcPct val="100000"/>
-              </a:lnSpc>
-              <a:spcBef>
-                <a:spcPts val="0"/>
-              </a:spcBef>
-              <a:spcAft>
-                <a:spcPts val="0"/>
-              </a:spcAft>
-              <a:buClr>
-                <a:srgbClr val="000000"/>
-              </a:buClr>
-              <a:buSzPts val="1000"/>
-              <a:buFont typeface="Arial"/>
-              <a:buNone/>
-              <a:defRPr b="0" i="0" sz="1000" u="none" cap="none" strike="noStrike">
-                <a:solidFill>
-                  <a:schemeClr val="dk2"/>
-                </a:solidFill>
-                <a:latin typeface="Playfair Display"/>
-                <a:ea typeface="Playfair Display"/>
-                <a:cs typeface="Playfair Display"/>
-                <a:sym typeface="Playfair Display"/>
-              </a:defRPr>
-            </a:lvl4pPr>
-            <a:lvl5pPr indent="0" lvl="4" marL="0" marR="0" algn="r">
-              <a:lnSpc>
-                <a:spcPct val="100000"/>
-              </a:lnSpc>
-              <a:spcBef>
-                <a:spcPts val="0"/>
-              </a:spcBef>
-              <a:spcAft>
-                <a:spcPts val="0"/>
-              </a:spcAft>
-              <a:buClr>
-                <a:srgbClr val="000000"/>
-              </a:buClr>
-              <a:buSzPts val="1000"/>
-              <a:buFont typeface="Arial"/>
-              <a:buNone/>
-              <a:defRPr b="0" i="0" sz="1000" u="none" cap="none" strike="noStrike">
-                <a:solidFill>
-                  <a:schemeClr val="dk2"/>
-                </a:solidFill>
-                <a:latin typeface="Playfair Display"/>
-                <a:ea typeface="Playfair Display"/>
-                <a:cs typeface="Playfair Display"/>
-                <a:sym typeface="Playfair Display"/>
-              </a:defRPr>
-            </a:lvl5pPr>
-            <a:lvl6pPr indent="0" lvl="5" marL="0" marR="0" algn="r">
-              <a:lnSpc>
-                <a:spcPct val="100000"/>
-              </a:lnSpc>
-              <a:spcBef>
-                <a:spcPts val="0"/>
-              </a:spcBef>
-              <a:spcAft>
-                <a:spcPts val="0"/>
-              </a:spcAft>
-              <a:buClr>
-                <a:srgbClr val="000000"/>
-              </a:buClr>
-              <a:buSzPts val="1000"/>
-              <a:buFont typeface="Arial"/>
-              <a:buNone/>
-              <a:defRPr b="0" i="0" sz="1000" u="none" cap="none" strike="noStrike">
-                <a:solidFill>
-                  <a:schemeClr val="dk2"/>
-                </a:solidFill>
-                <a:latin typeface="Playfair Display"/>
-                <a:ea typeface="Playfair Display"/>
-                <a:cs typeface="Playfair Display"/>
-                <a:sym typeface="Playfair Display"/>
-              </a:defRPr>
-            </a:lvl6pPr>
-            <a:lvl7pPr indent="0" lvl="6" marL="0" marR="0" algn="r">
-              <a:lnSpc>
-                <a:spcPct val="100000"/>
-              </a:lnSpc>
-              <a:spcBef>
-                <a:spcPts val="0"/>
-              </a:spcBef>
-              <a:spcAft>
-                <a:spcPts val="0"/>
-              </a:spcAft>
-              <a:buClr>
-                <a:srgbClr val="000000"/>
-              </a:buClr>
-              <a:buSzPts val="1000"/>
-              <a:buFont typeface="Arial"/>
-              <a:buNone/>
-              <a:defRPr b="0" i="0" sz="1000" u="none" cap="none" strike="noStrike">
-                <a:solidFill>
-                  <a:schemeClr val="dk2"/>
-                </a:solidFill>
-                <a:latin typeface="Playfair Display"/>
-                <a:ea typeface="Playfair Display"/>
-                <a:cs typeface="Playfair Display"/>
-                <a:sym typeface="Playfair Display"/>
-              </a:defRPr>
-            </a:lvl7pPr>
-            <a:lvl8pPr indent="0" lvl="7" marL="0" marR="0" algn="r">
-              <a:lnSpc>
-                <a:spcPct val="100000"/>
-              </a:lnSpc>
-              <a:spcBef>
-                <a:spcPts val="0"/>
-              </a:spcBef>
-              <a:spcAft>
-                <a:spcPts val="0"/>
-              </a:spcAft>
-              <a:buClr>
-                <a:srgbClr val="000000"/>
-              </a:buClr>
-              <a:buSzPts val="1000"/>
-              <a:buFont typeface="Arial"/>
-              <a:buNone/>
-              <a:defRPr b="0" i="0" sz="1000" u="none" cap="none" strike="noStrike">
-                <a:solidFill>
-                  <a:schemeClr val="dk2"/>
-                </a:solidFill>
-                <a:latin typeface="Playfair Display"/>
-                <a:ea typeface="Playfair Display"/>
-                <a:cs typeface="Playfair Display"/>
-                <a:sym typeface="Playfair Display"/>
-              </a:defRPr>
-            </a:lvl8pPr>
-            <a:lvl9pPr indent="0" lvl="8" marL="0" marR="0" algn="r">
-              <a:lnSpc>
-                <a:spcPct val="100000"/>
-              </a:lnSpc>
-              <a:spcBef>
-                <a:spcPts val="0"/>
-              </a:spcBef>
-              <a:spcAft>
-                <a:spcPts val="0"/>
-              </a:spcAft>
-              <a:buClr>
-                <a:srgbClr val="000000"/>
-              </a:buClr>
-              <a:buSzPts val="1000"/>
-              <a:buFont typeface="Arial"/>
-              <a:buNone/>
-              <a:defRPr b="0" i="0" sz="1000" u="none" cap="none" strike="noStrike">
-                <a:solidFill>
-                  <a:schemeClr val="dk2"/>
-                </a:solidFill>
-                <a:latin typeface="Playfair Display"/>
-                <a:ea typeface="Playfair Display"/>
-                <a:cs typeface="Playfair Display"/>
-                <a:sym typeface="Playfair Display"/>
-              </a:defRPr>
-            </a:lvl9pPr>
-          </a:lstStyle>
-          <a:p>
-            <a:pPr indent="0" lvl="0" marL="0" rtl="0" algn="r">
-              <a:spcBef>
-                <a:spcPts val="0"/>
-              </a:spcBef>
-              <a:spcAft>
-                <a:spcPts val="0"/>
-              </a:spcAft>
-              <a:buNone/>
-            </a:pPr>
-            <a:fld id="{00000000-1234-1234-1234-123412341234}" type="slidenum">
-              <a:rPr lang="en"/>
-              <a:t>‹#›</a:t>
-            </a:fld>
-            <a:endParaRPr/>
-          </a:p>
-        </p:txBody>
-      </p:sp>
-    </p:spTree>
-  </p:cSld>
-  <p:clrMapOvr>
-    <a:masterClrMapping/>
-  </p:clrMapOvr>
-</p:sldLayout>
-</file>
-
-<file path=ppt/slideLayouts/slideLayout4.xml><?xml version="1.0" encoding="utf-8"?>
-<p:sldLayout xmlns:a="http://schemas.openxmlformats.org/drawingml/2006/main" xmlns:r="http://schemas.openxmlformats.org/officeDocument/2006/relationships" xmlns:mc="http://schemas.openxmlformats.org/markup-compatibility/2006" xmlns:mv="urn:schemas-microsoft-com:mac:vml" xmlns:p="http://schemas.openxmlformats.org/presentationml/2006/main" xmlns:c="http://schemas.openxmlformats.org/drawingml/2006/chart" xmlns:dgm="http://schemas.openxmlformats.org/drawingml/2006/diagram" xmlns:o="urn:schemas-microsoft-com:office:office" xmlns:v="urn:schemas-microsoft-com:vml" xmlns:pvml="urn:schemas-microsoft-com:office:powerpoint" xmlns:com="http://schemas.openxmlformats.org/drawingml/2006/compatibility" xmlns:p14="http://schemas.microsoft.com/office/powerpoint/2010/main" xmlns:p15="http://schemas.microsoft.com/office/powerpoint/2012/main" xmlns:ahyp="http://schemas.microsoft.com/office/drawing/2018/hyperlinkcolor" matchingName="Section header" type="secHead">
-  <p:cSld name="SECTION_HEADER">
-    <p:bg>
-      <p:bgPr>
-        <a:solidFill>
-          <a:schemeClr val="accent5"/>
-        </a:solidFill>
-      </p:bgPr>
-    </p:bg>
-    <p:spTree>
-      <p:nvGrpSpPr>
-        <p:cNvPr id="21" name="Shape 21"/>
-        <p:cNvGrpSpPr/>
-        <p:nvPr/>
-      </p:nvGrpSpPr>
-      <p:grpSpPr>
-        <a:xfrm>
-          <a:off x="0" y="0"/>
-          <a:ext cx="0" cy="0"/>
-          <a:chOff x="0" y="0"/>
-          <a:chExt cx="0" cy="0"/>
-        </a:xfrm>
-      </p:grpSpPr>
-      <p:sp>
-        <p:nvSpPr>
-          <p:cNvPr id="22" name="Google Shape;22;p28"/>
+          <p:cNvPr id="20" name="Google Shape;20;p28"/>
           <p:cNvSpPr/>
           <p:nvPr/>
         </p:nvSpPr>
@@ -5441,7 +5255,7 @@
       </p:sp>
       <p:sp>
         <p:nvSpPr>
-          <p:cNvPr id="23" name="Google Shape;23;p28"/>
+          <p:cNvPr id="21" name="Google Shape;21;p28"/>
           <p:cNvSpPr txBox="1"/>
           <p:nvPr>
             <p:ph type="title"/>
@@ -5653,7 +5467,7 @@
       </p:sp>
       <p:sp>
         <p:nvSpPr>
-          <p:cNvPr id="24" name="Google Shape;24;p28"/>
+          <p:cNvPr id="22" name="Google Shape;22;p28"/>
           <p:cNvSpPr txBox="1"/>
           <p:nvPr>
             <p:ph idx="12" type="sldNum"/>
@@ -5938,12 +5752,12 @@
 </p:sldLayout>
 </file>
 
-<file path=ppt/slideLayouts/slideLayout5.xml><?xml version="1.0" encoding="utf-8"?>
+<file path=ppt/slideLayouts/slideLayout4.xml><?xml version="1.0" encoding="utf-8"?>
 <p:sldLayout xmlns:a="http://schemas.openxmlformats.org/drawingml/2006/main" xmlns:r="http://schemas.openxmlformats.org/officeDocument/2006/relationships" xmlns:mc="http://schemas.openxmlformats.org/markup-compatibility/2006" xmlns:mv="urn:schemas-microsoft-com:mac:vml" xmlns:p="http://schemas.openxmlformats.org/presentationml/2006/main" xmlns:c="http://schemas.openxmlformats.org/drawingml/2006/chart" xmlns:dgm="http://schemas.openxmlformats.org/drawingml/2006/diagram" xmlns:o="urn:schemas-microsoft-com:office:office" xmlns:v="urn:schemas-microsoft-com:vml" xmlns:pvml="urn:schemas-microsoft-com:office:powerpoint" xmlns:com="http://schemas.openxmlformats.org/drawingml/2006/compatibility" xmlns:p14="http://schemas.microsoft.com/office/powerpoint/2010/main" xmlns:p15="http://schemas.microsoft.com/office/powerpoint/2012/main" xmlns:ahyp="http://schemas.microsoft.com/office/drawing/2018/hyperlinkcolor" matchingName="Section title and description">
   <p:cSld name="SECTION_TITLE_AND_DESCRIPTION">
     <p:spTree>
       <p:nvGrpSpPr>
-        <p:cNvPr id="25" name="Shape 25"/>
+        <p:cNvPr id="23" name="Shape 23"/>
         <p:cNvGrpSpPr/>
         <p:nvPr/>
       </p:nvGrpSpPr>
@@ -5957,7 +5771,7 @@
       </p:grpSpPr>
       <p:sp>
         <p:nvSpPr>
-          <p:cNvPr id="26" name="Google Shape;26;p29"/>
+          <p:cNvPr id="24" name="Google Shape;24;p29"/>
           <p:cNvSpPr/>
           <p:nvPr/>
         </p:nvSpPr>
@@ -6016,7 +5830,7 @@
       </p:sp>
       <p:cxnSp>
         <p:nvCxnSpPr>
-          <p:cNvPr id="27" name="Google Shape;27;p29"/>
+          <p:cNvPr id="25" name="Google Shape;25;p29"/>
           <p:cNvCxnSpPr/>
           <p:nvPr/>
         </p:nvCxnSpPr>
@@ -6042,7 +5856,7 @@
       </p:cxnSp>
       <p:sp>
         <p:nvSpPr>
-          <p:cNvPr id="28" name="Google Shape;28;p29"/>
+          <p:cNvPr id="26" name="Google Shape;26;p29"/>
           <p:cNvSpPr txBox="1"/>
           <p:nvPr>
             <p:ph type="title"/>
@@ -6198,7 +6012,7 @@
       </p:sp>
       <p:sp>
         <p:nvSpPr>
-          <p:cNvPr id="29" name="Google Shape;29;p29"/>
+          <p:cNvPr id="27" name="Google Shape;27;p29"/>
           <p:cNvSpPr txBox="1"/>
           <p:nvPr>
             <p:ph idx="1" type="subTitle"/>
@@ -6354,7 +6168,7 @@
       </p:sp>
       <p:sp>
         <p:nvSpPr>
-          <p:cNvPr id="30" name="Google Shape;30;p29"/>
+          <p:cNvPr id="28" name="Google Shape;28;p29"/>
           <p:cNvSpPr txBox="1"/>
           <p:nvPr>
             <p:ph idx="2" type="body"/>
@@ -6546,7 +6360,7 @@
       </p:sp>
       <p:sp>
         <p:nvSpPr>
-          <p:cNvPr id="31" name="Google Shape;31;p29"/>
+          <p:cNvPr id="29" name="Google Shape;29;p29"/>
           <p:cNvSpPr txBox="1"/>
           <p:nvPr>
             <p:ph idx="12" type="sldNum"/>
@@ -6831,12 +6645,12 @@
 </p:sldLayout>
 </file>
 
-<file path=ppt/slideLayouts/slideLayout6.xml><?xml version="1.0" encoding="utf-8"?>
+<file path=ppt/slideLayouts/slideLayout5.xml><?xml version="1.0" encoding="utf-8"?>
 <p:sldLayout xmlns:a="http://schemas.openxmlformats.org/drawingml/2006/main" xmlns:r="http://schemas.openxmlformats.org/officeDocument/2006/relationships" xmlns:mc="http://schemas.openxmlformats.org/markup-compatibility/2006" xmlns:mv="urn:schemas-microsoft-com:mac:vml" xmlns:p="http://schemas.openxmlformats.org/presentationml/2006/main" xmlns:c="http://schemas.openxmlformats.org/drawingml/2006/chart" xmlns:dgm="http://schemas.openxmlformats.org/drawingml/2006/diagram" xmlns:o="urn:schemas-microsoft-com:office:office" xmlns:v="urn:schemas-microsoft-com:vml" xmlns:pvml="urn:schemas-microsoft-com:office:powerpoint" xmlns:com="http://schemas.openxmlformats.org/drawingml/2006/compatibility" xmlns:p14="http://schemas.microsoft.com/office/powerpoint/2010/main" xmlns:p15="http://schemas.microsoft.com/office/powerpoint/2012/main" xmlns:ahyp="http://schemas.microsoft.com/office/drawing/2018/hyperlinkcolor" matchingName="Title only" type="titleOnly">
   <p:cSld name="TITLE_ONLY">
     <p:spTree>
       <p:nvGrpSpPr>
-        <p:cNvPr id="32" name="Shape 32"/>
+        <p:cNvPr id="30" name="Shape 30"/>
         <p:cNvGrpSpPr/>
         <p:nvPr/>
       </p:nvGrpSpPr>
@@ -6850,7 +6664,7 @@
       </p:grpSpPr>
       <p:sp>
         <p:nvSpPr>
-          <p:cNvPr id="33" name="Google Shape;33;p30"/>
+          <p:cNvPr id="31" name="Google Shape;31;p30"/>
           <p:cNvSpPr txBox="1"/>
           <p:nvPr>
             <p:ph type="title"/>
@@ -7006,7 +6820,311 @@
       </p:sp>
       <p:sp>
         <p:nvSpPr>
-          <p:cNvPr id="34" name="Google Shape;34;p30"/>
+          <p:cNvPr id="32" name="Google Shape;32;p30"/>
+          <p:cNvSpPr txBox="1"/>
+          <p:nvPr>
+            <p:ph idx="12" type="sldNum"/>
+          </p:nvPr>
+        </p:nvSpPr>
+        <p:spPr>
+          <a:xfrm>
+            <a:off x="8497999" y="4688759"/>
+            <a:ext cx="548700" cy="393600"/>
+          </a:xfrm>
+          <a:prstGeom prst="rect">
+            <a:avLst/>
+          </a:prstGeom>
+          <a:noFill/>
+          <a:ln>
+            <a:noFill/>
+          </a:ln>
+        </p:spPr>
+        <p:txBody>
+          <a:bodyPr anchorCtr="0" anchor="ctr" bIns="91425" lIns="91425" spcFirstLastPara="1" rIns="91425" wrap="square" tIns="91425">
+            <a:noAutofit/>
+          </a:bodyPr>
+          <a:lstStyle>
+            <a:lvl1pPr indent="0" lvl="0" marL="0" marR="0" algn="r">
+              <a:lnSpc>
+                <a:spcPct val="100000"/>
+              </a:lnSpc>
+              <a:spcBef>
+                <a:spcPts val="0"/>
+              </a:spcBef>
+              <a:spcAft>
+                <a:spcPts val="0"/>
+              </a:spcAft>
+              <a:buClr>
+                <a:srgbClr val="000000"/>
+              </a:buClr>
+              <a:buSzPts val="1000"/>
+              <a:buFont typeface="Arial"/>
+              <a:buNone/>
+              <a:defRPr b="0" i="0" sz="1000" u="none" cap="none" strike="noStrike">
+                <a:solidFill>
+                  <a:schemeClr val="dk2"/>
+                </a:solidFill>
+                <a:latin typeface="Playfair Display"/>
+                <a:ea typeface="Playfair Display"/>
+                <a:cs typeface="Playfair Display"/>
+                <a:sym typeface="Playfair Display"/>
+              </a:defRPr>
+            </a:lvl1pPr>
+            <a:lvl2pPr indent="0" lvl="1" marL="0" marR="0" algn="r">
+              <a:lnSpc>
+                <a:spcPct val="100000"/>
+              </a:lnSpc>
+              <a:spcBef>
+                <a:spcPts val="0"/>
+              </a:spcBef>
+              <a:spcAft>
+                <a:spcPts val="0"/>
+              </a:spcAft>
+              <a:buClr>
+                <a:srgbClr val="000000"/>
+              </a:buClr>
+              <a:buSzPts val="1000"/>
+              <a:buFont typeface="Arial"/>
+              <a:buNone/>
+              <a:defRPr b="0" i="0" sz="1000" u="none" cap="none" strike="noStrike">
+                <a:solidFill>
+                  <a:schemeClr val="dk2"/>
+                </a:solidFill>
+                <a:latin typeface="Playfair Display"/>
+                <a:ea typeface="Playfair Display"/>
+                <a:cs typeface="Playfair Display"/>
+                <a:sym typeface="Playfair Display"/>
+              </a:defRPr>
+            </a:lvl2pPr>
+            <a:lvl3pPr indent="0" lvl="2" marL="0" marR="0" algn="r">
+              <a:lnSpc>
+                <a:spcPct val="100000"/>
+              </a:lnSpc>
+              <a:spcBef>
+                <a:spcPts val="0"/>
+              </a:spcBef>
+              <a:spcAft>
+                <a:spcPts val="0"/>
+              </a:spcAft>
+              <a:buClr>
+                <a:srgbClr val="000000"/>
+              </a:buClr>
+              <a:buSzPts val="1000"/>
+              <a:buFont typeface="Arial"/>
+              <a:buNone/>
+              <a:defRPr b="0" i="0" sz="1000" u="none" cap="none" strike="noStrike">
+                <a:solidFill>
+                  <a:schemeClr val="dk2"/>
+                </a:solidFill>
+                <a:latin typeface="Playfair Display"/>
+                <a:ea typeface="Playfair Display"/>
+                <a:cs typeface="Playfair Display"/>
+                <a:sym typeface="Playfair Display"/>
+              </a:defRPr>
+            </a:lvl3pPr>
+            <a:lvl4pPr indent="0" lvl="3" marL="0" marR="0" algn="r">
+              <a:lnSpc>
+                <a:spcPct val="100000"/>
+              </a:lnSpc>
+              <a:spcBef>
+                <a:spcPts val="0"/>
+              </a:spcBef>
+              <a:spcAft>
+                <a:spcPts val="0"/>
+              </a:spcAft>
+              <a:buClr>
+                <a:srgbClr val="000000"/>
+              </a:buClr>
+              <a:buSzPts val="1000"/>
+              <a:buFont typeface="Arial"/>
+              <a:buNone/>
+              <a:defRPr b="0" i="0" sz="1000" u="none" cap="none" strike="noStrike">
+                <a:solidFill>
+                  <a:schemeClr val="dk2"/>
+                </a:solidFill>
+                <a:latin typeface="Playfair Display"/>
+                <a:ea typeface="Playfair Display"/>
+                <a:cs typeface="Playfair Display"/>
+                <a:sym typeface="Playfair Display"/>
+              </a:defRPr>
+            </a:lvl4pPr>
+            <a:lvl5pPr indent="0" lvl="4" marL="0" marR="0" algn="r">
+              <a:lnSpc>
+                <a:spcPct val="100000"/>
+              </a:lnSpc>
+              <a:spcBef>
+                <a:spcPts val="0"/>
+              </a:spcBef>
+              <a:spcAft>
+                <a:spcPts val="0"/>
+              </a:spcAft>
+              <a:buClr>
+                <a:srgbClr val="000000"/>
+              </a:buClr>
+              <a:buSzPts val="1000"/>
+              <a:buFont typeface="Arial"/>
+              <a:buNone/>
+              <a:defRPr b="0" i="0" sz="1000" u="none" cap="none" strike="noStrike">
+                <a:solidFill>
+                  <a:schemeClr val="dk2"/>
+                </a:solidFill>
+                <a:latin typeface="Playfair Display"/>
+                <a:ea typeface="Playfair Display"/>
+                <a:cs typeface="Playfair Display"/>
+                <a:sym typeface="Playfair Display"/>
+              </a:defRPr>
+            </a:lvl5pPr>
+            <a:lvl6pPr indent="0" lvl="5" marL="0" marR="0" algn="r">
+              <a:lnSpc>
+                <a:spcPct val="100000"/>
+              </a:lnSpc>
+              <a:spcBef>
+                <a:spcPts val="0"/>
+              </a:spcBef>
+              <a:spcAft>
+                <a:spcPts val="0"/>
+              </a:spcAft>
+              <a:buClr>
+                <a:srgbClr val="000000"/>
+              </a:buClr>
+              <a:buSzPts val="1000"/>
+              <a:buFont typeface="Arial"/>
+              <a:buNone/>
+              <a:defRPr b="0" i="0" sz="1000" u="none" cap="none" strike="noStrike">
+                <a:solidFill>
+                  <a:schemeClr val="dk2"/>
+                </a:solidFill>
+                <a:latin typeface="Playfair Display"/>
+                <a:ea typeface="Playfair Display"/>
+                <a:cs typeface="Playfair Display"/>
+                <a:sym typeface="Playfair Display"/>
+              </a:defRPr>
+            </a:lvl6pPr>
+            <a:lvl7pPr indent="0" lvl="6" marL="0" marR="0" algn="r">
+              <a:lnSpc>
+                <a:spcPct val="100000"/>
+              </a:lnSpc>
+              <a:spcBef>
+                <a:spcPts val="0"/>
+              </a:spcBef>
+              <a:spcAft>
+                <a:spcPts val="0"/>
+              </a:spcAft>
+              <a:buClr>
+                <a:srgbClr val="000000"/>
+              </a:buClr>
+              <a:buSzPts val="1000"/>
+              <a:buFont typeface="Arial"/>
+              <a:buNone/>
+              <a:defRPr b="0" i="0" sz="1000" u="none" cap="none" strike="noStrike">
+                <a:solidFill>
+                  <a:schemeClr val="dk2"/>
+                </a:solidFill>
+                <a:latin typeface="Playfair Display"/>
+                <a:ea typeface="Playfair Display"/>
+                <a:cs typeface="Playfair Display"/>
+                <a:sym typeface="Playfair Display"/>
+              </a:defRPr>
+            </a:lvl7pPr>
+            <a:lvl8pPr indent="0" lvl="7" marL="0" marR="0" algn="r">
+              <a:lnSpc>
+                <a:spcPct val="100000"/>
+              </a:lnSpc>
+              <a:spcBef>
+                <a:spcPts val="0"/>
+              </a:spcBef>
+              <a:spcAft>
+                <a:spcPts val="0"/>
+              </a:spcAft>
+              <a:buClr>
+                <a:srgbClr val="000000"/>
+              </a:buClr>
+              <a:buSzPts val="1000"/>
+              <a:buFont typeface="Arial"/>
+              <a:buNone/>
+              <a:defRPr b="0" i="0" sz="1000" u="none" cap="none" strike="noStrike">
+                <a:solidFill>
+                  <a:schemeClr val="dk2"/>
+                </a:solidFill>
+                <a:latin typeface="Playfair Display"/>
+                <a:ea typeface="Playfair Display"/>
+                <a:cs typeface="Playfair Display"/>
+                <a:sym typeface="Playfair Display"/>
+              </a:defRPr>
+            </a:lvl8pPr>
+            <a:lvl9pPr indent="0" lvl="8" marL="0" marR="0" algn="r">
+              <a:lnSpc>
+                <a:spcPct val="100000"/>
+              </a:lnSpc>
+              <a:spcBef>
+                <a:spcPts val="0"/>
+              </a:spcBef>
+              <a:spcAft>
+                <a:spcPts val="0"/>
+              </a:spcAft>
+              <a:buClr>
+                <a:srgbClr val="000000"/>
+              </a:buClr>
+              <a:buSzPts val="1000"/>
+              <a:buFont typeface="Arial"/>
+              <a:buNone/>
+              <a:defRPr b="0" i="0" sz="1000" u="none" cap="none" strike="noStrike">
+                <a:solidFill>
+                  <a:schemeClr val="dk2"/>
+                </a:solidFill>
+                <a:latin typeface="Playfair Display"/>
+                <a:ea typeface="Playfair Display"/>
+                <a:cs typeface="Playfair Display"/>
+                <a:sym typeface="Playfair Display"/>
+              </a:defRPr>
+            </a:lvl9pPr>
+          </a:lstStyle>
+          <a:p>
+            <a:pPr indent="0" lvl="0" marL="0" rtl="0" algn="r">
+              <a:spcBef>
+                <a:spcPts val="0"/>
+              </a:spcBef>
+              <a:spcAft>
+                <a:spcPts val="0"/>
+              </a:spcAft>
+              <a:buNone/>
+            </a:pPr>
+            <a:fld id="{00000000-1234-1234-1234-123412341234}" type="slidenum">
+              <a:rPr lang="en"/>
+              <a:t>‹#›</a:t>
+            </a:fld>
+            <a:endParaRPr/>
+          </a:p>
+        </p:txBody>
+      </p:sp>
+    </p:spTree>
+  </p:cSld>
+  <p:clrMapOvr>
+    <a:masterClrMapping/>
+  </p:clrMapOvr>
+</p:sldLayout>
+</file>
+
+<file path=ppt/slideLayouts/slideLayout6.xml><?xml version="1.0" encoding="utf-8"?>
+<p:sldLayout xmlns:a="http://schemas.openxmlformats.org/drawingml/2006/main" xmlns:r="http://schemas.openxmlformats.org/officeDocument/2006/relationships" xmlns:mc="http://schemas.openxmlformats.org/markup-compatibility/2006" xmlns:mv="urn:schemas-microsoft-com:mac:vml" xmlns:p="http://schemas.openxmlformats.org/presentationml/2006/main" xmlns:c="http://schemas.openxmlformats.org/drawingml/2006/chart" xmlns:dgm="http://schemas.openxmlformats.org/drawingml/2006/diagram" xmlns:o="urn:schemas-microsoft-com:office:office" xmlns:v="urn:schemas-microsoft-com:vml" xmlns:pvml="urn:schemas-microsoft-com:office:powerpoint" xmlns:com="http://schemas.openxmlformats.org/drawingml/2006/compatibility" xmlns:p14="http://schemas.microsoft.com/office/powerpoint/2010/main" xmlns:p15="http://schemas.microsoft.com/office/powerpoint/2012/main" xmlns:ahyp="http://schemas.microsoft.com/office/drawing/2018/hyperlinkcolor" matchingName="Blank" type="blank">
+  <p:cSld name="BLANK">
+    <p:spTree>
+      <p:nvGrpSpPr>
+        <p:cNvPr id="33" name="Shape 33"/>
+        <p:cNvGrpSpPr/>
+        <p:nvPr/>
+      </p:nvGrpSpPr>
+      <p:grpSpPr>
+        <a:xfrm>
+          <a:off x="0" y="0"/>
+          <a:ext cx="0" cy="0"/>
+          <a:chOff x="0" y="0"/>
+          <a:chExt cx="0" cy="0"/>
+        </a:xfrm>
+      </p:grpSpPr>
+      <p:sp>
+        <p:nvSpPr>
+          <p:cNvPr id="34" name="Google Shape;34;p27"/>
           <p:cNvSpPr txBox="1"/>
           <p:nvPr>
             <p:ph idx="12" type="sldNum"/>
@@ -10902,11 +11020,7 @@
             </a:pPr>
             <a:r>
               <a:rPr lang="en" sz="2200"/>
-              <a:t>         </a:t>
-            </a:r>
-            <a:r>
-              <a:rPr lang="en" sz="2200"/>
-              <a:t>Lypengleang SEANG</a:t>
+              <a:t>         Lypengleang SEANG</a:t>
             </a:r>
             <a:endParaRPr sz="2200"/>
           </a:p>
@@ -11008,13 +11122,12 @@
           <p:cNvPicPr preferRelativeResize="0"/>
           <p:nvPr/>
         </p:nvPicPr>
-        <p:blipFill>
+        <p:blipFill rotWithShape="1">
           <a:blip r:embed="rId3">
             <a:alphaModFix/>
           </a:blip>
-          <a:stretch>
-            <a:fillRect/>
-          </a:stretch>
+          <a:srcRect b="0" l="0" r="0" t="0"/>
+          <a:stretch/>
         </p:blipFill>
         <p:spPr>
           <a:xfrm>
@@ -11057,7 +11170,7 @@
       </p:grpSpPr>
       <p:sp>
         <p:nvSpPr>
-          <p:cNvPr id="114" name="Google Shape;114;gb2cae244c0_0_11"/>
+          <p:cNvPr id="114" name="Google Shape;114;gba2ec81220_0_0"/>
           <p:cNvSpPr txBox="1"/>
           <p:nvPr>
             <p:ph type="title"/>
@@ -11097,7 +11210,7 @@
             </a:pPr>
             <a:r>
               <a:rPr lang="en" sz="2600"/>
-              <a:t>Accessiores</a:t>
+              <a:t>Login Page</a:t>
             </a:r>
             <a:endParaRPr sz="2600"/>
           </a:p>
@@ -11105,7 +11218,7 @@
       </p:sp>
       <p:sp>
         <p:nvSpPr>
-          <p:cNvPr id="115" name="Google Shape;115;gb2cae244c0_0_11"/>
+          <p:cNvPr id="115" name="Google Shape;115;gba2ec81220_0_0"/>
           <p:cNvSpPr txBox="1"/>
           <p:nvPr>
             <p:ph idx="1" type="subTitle"/>
@@ -11153,7 +11266,7 @@
       </p:sp>
       <p:pic>
         <p:nvPicPr>
-          <p:cNvPr id="116" name="Google Shape;116;gb2cae244c0_0_11"/>
+          <p:cNvPr id="116" name="Google Shape;116;gba2ec81220_0_0"/>
           <p:cNvPicPr preferRelativeResize="0"/>
           <p:nvPr/>
         </p:nvPicPr>
@@ -11167,8 +11280,8 @@
         </p:blipFill>
         <p:spPr>
           <a:xfrm>
-            <a:off x="1950653" y="0"/>
-            <a:ext cx="7193350" cy="5143500"/>
+            <a:off x="2042750" y="152400"/>
+            <a:ext cx="6717195" cy="4838702"/>
           </a:xfrm>
           <a:prstGeom prst="rect">
             <a:avLst/>
@@ -11206,7 +11319,156 @@
       </p:grpSpPr>
       <p:sp>
         <p:nvSpPr>
-          <p:cNvPr id="121" name="Google Shape;121;p20"/>
+          <p:cNvPr id="121" name="Google Shape;121;gba2ec81220_0_12"/>
+          <p:cNvSpPr txBox="1"/>
+          <p:nvPr>
+            <p:ph type="title"/>
+          </p:nvPr>
+        </p:nvSpPr>
+        <p:spPr>
+          <a:xfrm>
+            <a:off x="0" y="1282300"/>
+            <a:ext cx="2012400" cy="1289400"/>
+          </a:xfrm>
+          <a:prstGeom prst="rect">
+            <a:avLst/>
+          </a:prstGeom>
+          <a:noFill/>
+          <a:ln>
+            <a:noFill/>
+          </a:ln>
+        </p:spPr>
+        <p:txBody>
+          <a:bodyPr anchorCtr="0" anchor="b" bIns="91425" lIns="91425" spcFirstLastPara="1" rIns="91425" wrap="square" tIns="91425">
+            <a:noAutofit/>
+          </a:bodyPr>
+          <a:lstStyle/>
+          <a:p>
+            <a:pPr indent="0" lvl="0" marL="0" rtl="0" algn="ctr">
+              <a:lnSpc>
+                <a:spcPct val="100000"/>
+              </a:lnSpc>
+              <a:spcBef>
+                <a:spcPts val="0"/>
+              </a:spcBef>
+              <a:spcAft>
+                <a:spcPts val="0"/>
+              </a:spcAft>
+              <a:buSzPts val="4200"/>
+              <a:buNone/>
+            </a:pPr>
+            <a:r>
+              <a:rPr lang="en" sz="2600"/>
+              <a:t>Shopping Cart</a:t>
+            </a:r>
+            <a:endParaRPr sz="2600"/>
+          </a:p>
+        </p:txBody>
+      </p:sp>
+      <p:sp>
+        <p:nvSpPr>
+          <p:cNvPr id="122" name="Google Shape;122;gba2ec81220_0_12"/>
+          <p:cNvSpPr txBox="1"/>
+          <p:nvPr>
+            <p:ph idx="1" type="subTitle"/>
+          </p:nvPr>
+        </p:nvSpPr>
+        <p:spPr>
+          <a:xfrm>
+            <a:off x="-276250" y="2495550"/>
+            <a:ext cx="2150700" cy="507600"/>
+          </a:xfrm>
+          <a:prstGeom prst="rect">
+            <a:avLst/>
+          </a:prstGeom>
+          <a:noFill/>
+          <a:ln>
+            <a:noFill/>
+          </a:ln>
+        </p:spPr>
+        <p:txBody>
+          <a:bodyPr anchorCtr="0" anchor="t" bIns="91425" lIns="91425" spcFirstLastPara="1" rIns="91425" wrap="square" tIns="91425">
+            <a:noAutofit/>
+          </a:bodyPr>
+          <a:lstStyle/>
+          <a:p>
+            <a:pPr indent="0" lvl="0" marL="0" rtl="0" algn="ctr">
+              <a:lnSpc>
+                <a:spcPct val="100000"/>
+              </a:lnSpc>
+              <a:spcBef>
+                <a:spcPts val="0"/>
+              </a:spcBef>
+              <a:spcAft>
+                <a:spcPts val="0"/>
+              </a:spcAft>
+              <a:buSzPts val="2100"/>
+              <a:buNone/>
+            </a:pPr>
+            <a:r>
+              <a:rPr lang="en" sz="1500"/>
+              <a:t>(Product catalog)</a:t>
+            </a:r>
+            <a:endParaRPr sz="1500"/>
+          </a:p>
+        </p:txBody>
+      </p:sp>
+      <p:pic>
+        <p:nvPicPr>
+          <p:cNvPr id="123" name="Google Shape;123;gba2ec81220_0_12"/>
+          <p:cNvPicPr preferRelativeResize="0"/>
+          <p:nvPr/>
+        </p:nvPicPr>
+        <p:blipFill>
+          <a:blip r:embed="rId3">
+            <a:alphaModFix/>
+          </a:blip>
+          <a:stretch>
+            <a:fillRect/>
+          </a:stretch>
+        </p:blipFill>
+        <p:spPr>
+          <a:xfrm>
+            <a:off x="2101175" y="710825"/>
+            <a:ext cx="6826800" cy="3456699"/>
+          </a:xfrm>
+          <a:prstGeom prst="rect">
+            <a:avLst/>
+          </a:prstGeom>
+          <a:noFill/>
+          <a:ln>
+            <a:noFill/>
+          </a:ln>
+        </p:spPr>
+      </p:pic>
+    </p:spTree>
+  </p:cSld>
+  <p:clrMapOvr>
+    <a:masterClrMapping/>
+  </p:clrMapOvr>
+</p:sld>
+</file>
+
+<file path=ppt/slides/slide12.xml><?xml version="1.0" encoding="utf-8"?>
+<p:sld xmlns:a="http://schemas.openxmlformats.org/drawingml/2006/main" xmlns:r="http://schemas.openxmlformats.org/officeDocument/2006/relationships" xmlns:mc="http://schemas.openxmlformats.org/markup-compatibility/2006" xmlns:mv="urn:schemas-microsoft-com:mac:vml" xmlns:p="http://schemas.openxmlformats.org/presentationml/2006/main" xmlns:c="http://schemas.openxmlformats.org/drawingml/2006/chart" xmlns:dgm="http://schemas.openxmlformats.org/drawingml/2006/diagram" xmlns:o="urn:schemas-microsoft-com:office:office" xmlns:v="urn:schemas-microsoft-com:vml" xmlns:pvml="urn:schemas-microsoft-com:office:powerpoint" xmlns:com="http://schemas.openxmlformats.org/drawingml/2006/compatibility" xmlns:p14="http://schemas.microsoft.com/office/powerpoint/2010/main" xmlns:p15="http://schemas.microsoft.com/office/powerpoint/2012/main" xmlns:ahyp="http://schemas.microsoft.com/office/drawing/2018/hyperlinkcolor">
+  <p:cSld>
+    <p:spTree>
+      <p:nvGrpSpPr>
+        <p:cNvPr id="127" name="Shape 127"/>
+        <p:cNvGrpSpPr/>
+        <p:nvPr/>
+      </p:nvGrpSpPr>
+      <p:grpSpPr>
+        <a:xfrm>
+          <a:off x="0" y="0"/>
+          <a:ext cx="0" cy="0"/>
+          <a:chOff x="0" y="0"/>
+          <a:chExt cx="0" cy="0"/>
+        </a:xfrm>
+      </p:grpSpPr>
+      <p:sp>
+        <p:nvSpPr>
+          <p:cNvPr id="128" name="Google Shape;128;p20"/>
           <p:cNvSpPr txBox="1"/>
           <p:nvPr>
             <p:ph type="title"/>
@@ -11254,17 +11516,16 @@
       </p:sp>
       <p:pic>
         <p:nvPicPr>
-          <p:cNvPr id="122" name="Google Shape;122;p20"/>
+          <p:cNvPr id="129" name="Google Shape;129;p20"/>
           <p:cNvPicPr preferRelativeResize="0"/>
           <p:nvPr/>
         </p:nvPicPr>
-        <p:blipFill>
+        <p:blipFill rotWithShape="1">
           <a:blip r:embed="rId3">
             <a:alphaModFix/>
           </a:blip>
-          <a:stretch>
-            <a:fillRect/>
-          </a:stretch>
+          <a:srcRect b="0" l="0" r="0" t="0"/>
+          <a:stretch/>
         </p:blipFill>
         <p:spPr>
           <a:xfrm>
@@ -11282,17 +11543,16 @@
       </p:pic>
       <p:pic>
         <p:nvPicPr>
-          <p:cNvPr id="123" name="Google Shape;123;p20"/>
+          <p:cNvPr id="130" name="Google Shape;130;p20"/>
           <p:cNvPicPr preferRelativeResize="0"/>
           <p:nvPr/>
         </p:nvPicPr>
-        <p:blipFill>
+        <p:blipFill rotWithShape="1">
           <a:blip r:embed="rId4">
             <a:alphaModFix/>
           </a:blip>
-          <a:stretch>
-            <a:fillRect/>
-          </a:stretch>
+          <a:srcRect b="0" l="0" r="0" t="0"/>
+          <a:stretch/>
         </p:blipFill>
         <p:spPr>
           <a:xfrm>
@@ -11310,17 +11570,16 @@
       </p:pic>
       <p:pic>
         <p:nvPicPr>
-          <p:cNvPr id="124" name="Google Shape;124;p20"/>
+          <p:cNvPr id="131" name="Google Shape;131;p20"/>
           <p:cNvPicPr preferRelativeResize="0"/>
           <p:nvPr/>
         </p:nvPicPr>
-        <p:blipFill>
+        <p:blipFill rotWithShape="1">
           <a:blip r:embed="rId5">
             <a:alphaModFix/>
           </a:blip>
-          <a:stretch>
-            <a:fillRect/>
-          </a:stretch>
+          <a:srcRect b="0" l="0" r="0" t="0"/>
+          <a:stretch/>
         </p:blipFill>
         <p:spPr>
           <a:xfrm>
@@ -11344,12 +11603,12 @@
 </p:sld>
 </file>
 
-<file path=ppt/slides/slide12.xml><?xml version="1.0" encoding="utf-8"?>
+<file path=ppt/slides/slide13.xml><?xml version="1.0" encoding="utf-8"?>
 <p:sld xmlns:a="http://schemas.openxmlformats.org/drawingml/2006/main" xmlns:r="http://schemas.openxmlformats.org/officeDocument/2006/relationships" xmlns:mc="http://schemas.openxmlformats.org/markup-compatibility/2006" xmlns:mv="urn:schemas-microsoft-com:mac:vml" xmlns:p="http://schemas.openxmlformats.org/presentationml/2006/main" xmlns:c="http://schemas.openxmlformats.org/drawingml/2006/chart" xmlns:dgm="http://schemas.openxmlformats.org/drawingml/2006/diagram" xmlns:o="urn:schemas-microsoft-com:office:office" xmlns:v="urn:schemas-microsoft-com:vml" xmlns:pvml="urn:schemas-microsoft-com:office:powerpoint" xmlns:com="http://schemas.openxmlformats.org/drawingml/2006/compatibility" xmlns:p14="http://schemas.microsoft.com/office/powerpoint/2010/main" xmlns:p15="http://schemas.microsoft.com/office/powerpoint/2012/main" xmlns:ahyp="http://schemas.microsoft.com/office/drawing/2018/hyperlinkcolor">
   <p:cSld>
     <p:spTree>
       <p:nvGrpSpPr>
-        <p:cNvPr id="128" name="Shape 128"/>
+        <p:cNvPr id="135" name="Shape 135"/>
         <p:cNvGrpSpPr/>
         <p:nvPr/>
       </p:nvGrpSpPr>
@@ -11363,7 +11622,7 @@
       </p:grpSpPr>
       <p:sp>
         <p:nvSpPr>
-          <p:cNvPr id="129" name="Google Shape;129;p21"/>
+          <p:cNvPr id="136" name="Google Shape;136;p21"/>
           <p:cNvSpPr txBox="1"/>
           <p:nvPr>
             <p:ph type="title"/>
@@ -11411,17 +11670,16 @@
       </p:sp>
       <p:pic>
         <p:nvPicPr>
-          <p:cNvPr id="130" name="Google Shape;130;p21"/>
+          <p:cNvPr id="137" name="Google Shape;137;p21"/>
           <p:cNvPicPr preferRelativeResize="0"/>
           <p:nvPr/>
         </p:nvPicPr>
-        <p:blipFill>
+        <p:blipFill rotWithShape="1">
           <a:blip r:embed="rId3">
             <a:alphaModFix/>
           </a:blip>
-          <a:stretch>
-            <a:fillRect/>
-          </a:stretch>
+          <a:srcRect b="0" l="0" r="0" t="0"/>
+          <a:stretch/>
         </p:blipFill>
         <p:spPr>
           <a:xfrm>
@@ -11439,17 +11697,16 @@
       </p:pic>
       <p:pic>
         <p:nvPicPr>
-          <p:cNvPr id="131" name="Google Shape;131;p21"/>
+          <p:cNvPr id="138" name="Google Shape;138;p21"/>
           <p:cNvPicPr preferRelativeResize="0"/>
           <p:nvPr/>
         </p:nvPicPr>
-        <p:blipFill>
+        <p:blipFill rotWithShape="1">
           <a:blip r:embed="rId4">
             <a:alphaModFix/>
           </a:blip>
-          <a:stretch>
-            <a:fillRect/>
-          </a:stretch>
+          <a:srcRect b="0" l="0" r="0" t="0"/>
+          <a:stretch/>
         </p:blipFill>
         <p:spPr>
           <a:xfrm>
@@ -11467,17 +11724,16 @@
       </p:pic>
       <p:pic>
         <p:nvPicPr>
-          <p:cNvPr id="132" name="Google Shape;132;p21"/>
+          <p:cNvPr id="139" name="Google Shape;139;p21"/>
           <p:cNvPicPr preferRelativeResize="0"/>
           <p:nvPr/>
         </p:nvPicPr>
-        <p:blipFill>
+        <p:blipFill rotWithShape="1">
           <a:blip r:embed="rId5">
             <a:alphaModFix/>
           </a:blip>
-          <a:stretch>
-            <a:fillRect/>
-          </a:stretch>
+          <a:srcRect b="0" l="0" r="0" t="0"/>
+          <a:stretch/>
         </p:blipFill>
         <p:spPr>
           <a:xfrm>
@@ -11495,155 +11751,21 @@
       </p:pic>
       <p:pic>
         <p:nvPicPr>
-          <p:cNvPr id="133" name="Google Shape;133;p21"/>
+          <p:cNvPr id="140" name="Google Shape;140;p21"/>
           <p:cNvPicPr preferRelativeResize="0"/>
           <p:nvPr/>
         </p:nvPicPr>
-        <p:blipFill>
+        <p:blipFill rotWithShape="1">
           <a:blip r:embed="rId6">
             <a:alphaModFix/>
           </a:blip>
-          <a:stretch>
-            <a:fillRect/>
-          </a:stretch>
+          <a:srcRect b="0" l="0" r="0" t="0"/>
+          <a:stretch/>
         </p:blipFill>
         <p:spPr>
           <a:xfrm>
             <a:off x="5270450" y="1538500"/>
             <a:ext cx="2581075" cy="2581075"/>
-          </a:xfrm>
-          <a:prstGeom prst="rect">
-            <a:avLst/>
-          </a:prstGeom>
-          <a:noFill/>
-          <a:ln>
-            <a:noFill/>
-          </a:ln>
-        </p:spPr>
-      </p:pic>
-    </p:spTree>
-  </p:cSld>
-  <p:clrMapOvr>
-    <a:masterClrMapping/>
-  </p:clrMapOvr>
-</p:sld>
-</file>
-
-<file path=ppt/slides/slide13.xml><?xml version="1.0" encoding="utf-8"?>
-<p:sld xmlns:a="http://schemas.openxmlformats.org/drawingml/2006/main" xmlns:r="http://schemas.openxmlformats.org/officeDocument/2006/relationships" xmlns:mc="http://schemas.openxmlformats.org/markup-compatibility/2006" xmlns:mv="urn:schemas-microsoft-com:mac:vml" xmlns:p="http://schemas.openxmlformats.org/presentationml/2006/main" xmlns:c="http://schemas.openxmlformats.org/drawingml/2006/chart" xmlns:dgm="http://schemas.openxmlformats.org/drawingml/2006/diagram" xmlns:o="urn:schemas-microsoft-com:office:office" xmlns:v="urn:schemas-microsoft-com:vml" xmlns:pvml="urn:schemas-microsoft-com:office:powerpoint" xmlns:com="http://schemas.openxmlformats.org/drawingml/2006/compatibility" xmlns:p14="http://schemas.microsoft.com/office/powerpoint/2010/main" xmlns:p15="http://schemas.microsoft.com/office/powerpoint/2012/main" xmlns:ahyp="http://schemas.microsoft.com/office/drawing/2018/hyperlinkcolor">
-  <p:cSld>
-    <p:spTree>
-      <p:nvGrpSpPr>
-        <p:cNvPr id="137" name="Shape 137"/>
-        <p:cNvGrpSpPr/>
-        <p:nvPr/>
-      </p:nvGrpSpPr>
-      <p:grpSpPr>
-        <a:xfrm>
-          <a:off x="0" y="0"/>
-          <a:ext cx="0" cy="0"/>
-          <a:chOff x="0" y="0"/>
-          <a:chExt cx="0" cy="0"/>
-        </a:xfrm>
-      </p:grpSpPr>
-      <p:sp>
-        <p:nvSpPr>
-          <p:cNvPr id="138" name="Google Shape;138;p23"/>
-          <p:cNvSpPr txBox="1"/>
-          <p:nvPr>
-            <p:ph type="title"/>
-          </p:nvPr>
-        </p:nvSpPr>
-        <p:spPr>
-          <a:xfrm>
-            <a:off x="311700" y="445025"/>
-            <a:ext cx="8520600" cy="572700"/>
-          </a:xfrm>
-          <a:prstGeom prst="rect">
-            <a:avLst/>
-          </a:prstGeom>
-          <a:noFill/>
-          <a:ln>
-            <a:noFill/>
-          </a:ln>
-        </p:spPr>
-        <p:txBody>
-          <a:bodyPr anchorCtr="0" anchor="t" bIns="91425" lIns="91425" spcFirstLastPara="1" rIns="91425" wrap="square" tIns="91425">
-            <a:noAutofit/>
-          </a:bodyPr>
-          <a:lstStyle/>
-          <a:p>
-            <a:pPr indent="0" lvl="0" marL="0" rtl="0" algn="l">
-              <a:lnSpc>
-                <a:spcPct val="100000"/>
-              </a:lnSpc>
-              <a:spcBef>
-                <a:spcPts val="0"/>
-              </a:spcBef>
-              <a:spcAft>
-                <a:spcPts val="0"/>
-              </a:spcAft>
-              <a:buSzPts val="3000"/>
-              <a:buNone/>
-            </a:pPr>
-            <a:r>
-              <a:rPr lang="en"/>
-              <a:t>C</a:t>
-            </a:r>
-            <a:r>
-              <a:rPr lang="en"/>
-              <a:t>oding Tools:</a:t>
-            </a:r>
-            <a:endParaRPr/>
-          </a:p>
-        </p:txBody>
-      </p:sp>
-      <p:pic>
-        <p:nvPicPr>
-          <p:cNvPr id="139" name="Google Shape;139;p23"/>
-          <p:cNvPicPr preferRelativeResize="0"/>
-          <p:nvPr/>
-        </p:nvPicPr>
-        <p:blipFill>
-          <a:blip r:embed="rId3">
-            <a:alphaModFix/>
-          </a:blip>
-          <a:stretch>
-            <a:fillRect/>
-          </a:stretch>
-        </p:blipFill>
-        <p:spPr>
-          <a:xfrm>
-            <a:off x="856550" y="1776413"/>
-            <a:ext cx="2867025" cy="1590675"/>
-          </a:xfrm>
-          <a:prstGeom prst="rect">
-            <a:avLst/>
-          </a:prstGeom>
-          <a:noFill/>
-          <a:ln>
-            <a:noFill/>
-          </a:ln>
-        </p:spPr>
-      </p:pic>
-      <p:pic>
-        <p:nvPicPr>
-          <p:cNvPr id="140" name="Google Shape;140;p23"/>
-          <p:cNvPicPr preferRelativeResize="0"/>
-          <p:nvPr/>
-        </p:nvPicPr>
-        <p:blipFill>
-          <a:blip r:embed="rId4">
-            <a:alphaModFix/>
-          </a:blip>
-          <a:stretch>
-            <a:fillRect/>
-          </a:stretch>
-        </p:blipFill>
-        <p:spPr>
-          <a:xfrm>
-            <a:off x="5513875" y="1891500"/>
-            <a:ext cx="1712875" cy="1712875"/>
           </a:xfrm>
           <a:prstGeom prst="rect">
             <a:avLst/>
@@ -11681,7 +11803,134 @@
       </p:grpSpPr>
       <p:sp>
         <p:nvSpPr>
-          <p:cNvPr id="145" name="Google Shape;145;gb2cae244c0_0_37"/>
+          <p:cNvPr id="145" name="Google Shape;145;p23"/>
+          <p:cNvSpPr txBox="1"/>
+          <p:nvPr>
+            <p:ph type="title"/>
+          </p:nvPr>
+        </p:nvSpPr>
+        <p:spPr>
+          <a:xfrm>
+            <a:off x="311700" y="445025"/>
+            <a:ext cx="8520600" cy="572700"/>
+          </a:xfrm>
+          <a:prstGeom prst="rect">
+            <a:avLst/>
+          </a:prstGeom>
+          <a:noFill/>
+          <a:ln>
+            <a:noFill/>
+          </a:ln>
+        </p:spPr>
+        <p:txBody>
+          <a:bodyPr anchorCtr="0" anchor="t" bIns="91425" lIns="91425" spcFirstLastPara="1" rIns="91425" wrap="square" tIns="91425">
+            <a:noAutofit/>
+          </a:bodyPr>
+          <a:lstStyle/>
+          <a:p>
+            <a:pPr indent="0" lvl="0" marL="0" rtl="0" algn="l">
+              <a:lnSpc>
+                <a:spcPct val="100000"/>
+              </a:lnSpc>
+              <a:spcBef>
+                <a:spcPts val="0"/>
+              </a:spcBef>
+              <a:spcAft>
+                <a:spcPts val="0"/>
+              </a:spcAft>
+              <a:buSzPts val="3000"/>
+              <a:buNone/>
+            </a:pPr>
+            <a:r>
+              <a:rPr lang="en"/>
+              <a:t>Coding Tools:</a:t>
+            </a:r>
+            <a:endParaRPr/>
+          </a:p>
+        </p:txBody>
+      </p:sp>
+      <p:pic>
+        <p:nvPicPr>
+          <p:cNvPr id="146" name="Google Shape;146;p23"/>
+          <p:cNvPicPr preferRelativeResize="0"/>
+          <p:nvPr/>
+        </p:nvPicPr>
+        <p:blipFill rotWithShape="1">
+          <a:blip r:embed="rId3">
+            <a:alphaModFix/>
+          </a:blip>
+          <a:srcRect b="0" l="0" r="0" t="0"/>
+          <a:stretch/>
+        </p:blipFill>
+        <p:spPr>
+          <a:xfrm>
+            <a:off x="856550" y="1776413"/>
+            <a:ext cx="2867025" cy="1590675"/>
+          </a:xfrm>
+          <a:prstGeom prst="rect">
+            <a:avLst/>
+          </a:prstGeom>
+          <a:noFill/>
+          <a:ln>
+            <a:noFill/>
+          </a:ln>
+        </p:spPr>
+      </p:pic>
+      <p:pic>
+        <p:nvPicPr>
+          <p:cNvPr id="147" name="Google Shape;147;p23"/>
+          <p:cNvPicPr preferRelativeResize="0"/>
+          <p:nvPr/>
+        </p:nvPicPr>
+        <p:blipFill rotWithShape="1">
+          <a:blip r:embed="rId4">
+            <a:alphaModFix/>
+          </a:blip>
+          <a:srcRect b="0" l="0" r="0" t="0"/>
+          <a:stretch/>
+        </p:blipFill>
+        <p:spPr>
+          <a:xfrm>
+            <a:off x="5513875" y="1891500"/>
+            <a:ext cx="1712875" cy="1712875"/>
+          </a:xfrm>
+          <a:prstGeom prst="rect">
+            <a:avLst/>
+          </a:prstGeom>
+          <a:noFill/>
+          <a:ln>
+            <a:noFill/>
+          </a:ln>
+        </p:spPr>
+      </p:pic>
+    </p:spTree>
+  </p:cSld>
+  <p:clrMapOvr>
+    <a:masterClrMapping/>
+  </p:clrMapOvr>
+</p:sld>
+</file>
+
+<file path=ppt/slides/slide15.xml><?xml version="1.0" encoding="utf-8"?>
+<p:sld xmlns:a="http://schemas.openxmlformats.org/drawingml/2006/main" xmlns:r="http://schemas.openxmlformats.org/officeDocument/2006/relationships" xmlns:mc="http://schemas.openxmlformats.org/markup-compatibility/2006" xmlns:mv="urn:schemas-microsoft-com:mac:vml" xmlns:p="http://schemas.openxmlformats.org/presentationml/2006/main" xmlns:c="http://schemas.openxmlformats.org/drawingml/2006/chart" xmlns:dgm="http://schemas.openxmlformats.org/drawingml/2006/diagram" xmlns:o="urn:schemas-microsoft-com:office:office" xmlns:v="urn:schemas-microsoft-com:vml" xmlns:pvml="urn:schemas-microsoft-com:office:powerpoint" xmlns:com="http://schemas.openxmlformats.org/drawingml/2006/compatibility" xmlns:p14="http://schemas.microsoft.com/office/powerpoint/2010/main" xmlns:p15="http://schemas.microsoft.com/office/powerpoint/2012/main" xmlns:ahyp="http://schemas.microsoft.com/office/drawing/2018/hyperlinkcolor">
+  <p:cSld>
+    <p:spTree>
+      <p:nvGrpSpPr>
+        <p:cNvPr id="151" name="Shape 151"/>
+        <p:cNvGrpSpPr/>
+        <p:nvPr/>
+      </p:nvGrpSpPr>
+      <p:grpSpPr>
+        <a:xfrm>
+          <a:off x="0" y="0"/>
+          <a:ext cx="0" cy="0"/>
+          <a:chOff x="0" y="0"/>
+          <a:chExt cx="0" cy="0"/>
+        </a:xfrm>
+      </p:grpSpPr>
+      <p:sp>
+        <p:nvSpPr>
+          <p:cNvPr id="152" name="Google Shape;152;gb2cae244c0_0_37"/>
           <p:cNvSpPr txBox="1"/>
           <p:nvPr>
             <p:ph type="title"/>
@@ -11695,6 +11944,10 @@
           <a:prstGeom prst="rect">
             <a:avLst/>
           </a:prstGeom>
+          <a:noFill/>
+          <a:ln>
+            <a:noFill/>
+          </a:ln>
         </p:spPr>
         <p:txBody>
           <a:bodyPr anchorCtr="0" anchor="t" bIns="91425" lIns="91425" spcFirstLastPara="1" rIns="91425" wrap="square" tIns="91425">
@@ -11703,12 +11956,16 @@
           <a:lstStyle/>
           <a:p>
             <a:pPr indent="0" lvl="0" marL="0" rtl="0" algn="ctr">
-              <a:spcBef>
-                <a:spcPts val="0"/>
-              </a:spcBef>
-              <a:spcAft>
-                <a:spcPts val="0"/>
-              </a:spcAft>
+              <a:lnSpc>
+                <a:spcPct val="100000"/>
+              </a:lnSpc>
+              <a:spcBef>
+                <a:spcPts val="0"/>
+              </a:spcBef>
+              <a:spcAft>
+                <a:spcPts val="0"/>
+              </a:spcAft>
+              <a:buSzPts val="3000"/>
               <a:buNone/>
             </a:pPr>
             <a:r>
@@ -11719,12 +11976,16 @@
           </a:p>
           <a:p>
             <a:pPr indent="0" lvl="0" marL="0" rtl="0" algn="ctr">
-              <a:spcBef>
-                <a:spcPts val="0"/>
-              </a:spcBef>
-              <a:spcAft>
-                <a:spcPts val="0"/>
-              </a:spcAft>
+              <a:lnSpc>
+                <a:spcPct val="100000"/>
+              </a:lnSpc>
+              <a:spcBef>
+                <a:spcPts val="0"/>
+              </a:spcBef>
+              <a:spcAft>
+                <a:spcPts val="0"/>
+              </a:spcAft>
+              <a:buSzPts val="3000"/>
               <a:buNone/>
             </a:pPr>
             <a:r>
@@ -11735,12 +11996,16 @@
           </a:p>
           <a:p>
             <a:pPr indent="0" lvl="0" marL="0" rtl="0" algn="ctr">
-              <a:spcBef>
-                <a:spcPts val="0"/>
-              </a:spcBef>
-              <a:spcAft>
-                <a:spcPts val="0"/>
-              </a:spcAft>
+              <a:lnSpc>
+                <a:spcPct val="100000"/>
+              </a:lnSpc>
+              <a:spcBef>
+                <a:spcPts val="0"/>
+              </a:spcBef>
+              <a:spcAft>
+                <a:spcPts val="0"/>
+              </a:spcAft>
+              <a:buSzPts val="3000"/>
               <a:buNone/>
             </a:pPr>
             <a:r>
@@ -11751,12 +12016,16 @@
           </a:p>
           <a:p>
             <a:pPr indent="0" lvl="0" marL="0" rtl="0" algn="ctr">
-              <a:spcBef>
-                <a:spcPts val="0"/>
-              </a:spcBef>
-              <a:spcAft>
-                <a:spcPts val="0"/>
-              </a:spcAft>
+              <a:lnSpc>
+                <a:spcPct val="100000"/>
+              </a:lnSpc>
+              <a:spcBef>
+                <a:spcPts val="0"/>
+              </a:spcBef>
+              <a:spcAft>
+                <a:spcPts val="0"/>
+              </a:spcAft>
+              <a:buSzPts val="3000"/>
               <a:buNone/>
             </a:pPr>
             <a:r>
@@ -12346,13 +12615,12 @@
           <p:cNvPicPr preferRelativeResize="0"/>
           <p:nvPr/>
         </p:nvPicPr>
-        <p:blipFill>
+        <p:blipFill rotWithShape="1">
           <a:blip r:embed="rId3">
             <a:alphaModFix/>
           </a:blip>
-          <a:stretch>
-            <a:fillRect/>
-          </a:stretch>
+          <a:srcRect b="0" l="0" r="0" t="0"/>
+          <a:stretch/>
         </p:blipFill>
         <p:spPr>
           <a:xfrm>
@@ -12522,13 +12790,12 @@
           <p:cNvPicPr preferRelativeResize="0"/>
           <p:nvPr/>
         </p:nvPicPr>
-        <p:blipFill>
+        <p:blipFill rotWithShape="1">
           <a:blip r:embed="rId3">
             <a:alphaModFix/>
           </a:blip>
-          <a:stretch>
-            <a:fillRect/>
-          </a:stretch>
+          <a:srcRect b="0" l="0" r="0" t="0"/>
+          <a:stretch/>
         </p:blipFill>
         <p:spPr>
           <a:xfrm>
@@ -12671,13 +12938,12 @@
           <p:cNvPicPr preferRelativeResize="0"/>
           <p:nvPr/>
         </p:nvPicPr>
-        <p:blipFill>
+        <p:blipFill rotWithShape="1">
           <a:blip r:embed="rId3">
             <a:alphaModFix/>
           </a:blip>
-          <a:stretch>
-            <a:fillRect/>
-          </a:stretch>
+          <a:srcRect b="0" l="0" r="0" t="0"/>
+          <a:stretch/>
         </p:blipFill>
         <p:spPr>
           <a:xfrm>
@@ -12820,13 +13086,12 @@
           <p:cNvPicPr preferRelativeResize="0"/>
           <p:nvPr/>
         </p:nvPicPr>
-        <p:blipFill>
+        <p:blipFill rotWithShape="1">
           <a:blip r:embed="rId3">
             <a:alphaModFix/>
           </a:blip>
-          <a:stretch>
-            <a:fillRect/>
-          </a:stretch>
+          <a:srcRect b="0" l="0" r="0" t="0"/>
+          <a:stretch/>
         </p:blipFill>
         <p:spPr>
           <a:xfrm>

</xml_diff>